<commit_message>
Completes iOCO carousel screen
</commit_message>
<xml_diff>
--- a/ioco_carousel_screen.pptx
+++ b/ioco_carousel_screen.pptx
@@ -2966,21 +2966,363 @@
       </p:grpSpPr>
       <p:sp>
         <p:nvSpPr>
-          <p:cNvPr id="4" name="Rectangle 3"/>
+          <p:cNvPr id="17" name="Rectangle 16"/>
           <p:cNvSpPr/>
           <p:nvPr/>
         </p:nvSpPr>
         <p:spPr>
           <a:xfrm>
-            <a:off x="3832411" y="1801906"/>
-            <a:ext cx="3065930" cy="3186953"/>
+            <a:off x="2544820" y="3935927"/>
+            <a:ext cx="1367237" cy="967406"/>
           </a:xfrm>
           <a:prstGeom prst="rect">
             <a:avLst/>
           </a:prstGeom>
           <a:solidFill>
-            <a:schemeClr val="bg1">
+            <a:srgbClr val="FFCB05"/>
+          </a:solidFill>
+          <a:ln>
+            <a:noFill/>
+          </a:ln>
+          <a:effectLst>
+            <a:outerShdw blurRad="228600" dist="25400" sx="102000" sy="102000" algn="ctr" rotWithShape="0">
+              <a:prstClr val="black">
+                <a:alpha val="5000"/>
+              </a:prstClr>
+            </a:outerShdw>
+          </a:effectLst>
+        </p:spPr>
+        <p:style>
+          <a:lnRef idx="2">
+            <a:schemeClr val="accent1">
+              <a:shade val="50000"/>
+            </a:schemeClr>
+          </a:lnRef>
+          <a:fillRef idx="1">
+            <a:schemeClr val="accent1"/>
+          </a:fillRef>
+          <a:effectRef idx="0">
+            <a:schemeClr val="accent1"/>
+          </a:effectRef>
+          <a:fontRef idx="minor">
+            <a:schemeClr val="lt1"/>
+          </a:fontRef>
+        </p:style>
+        <p:txBody>
+          <a:bodyPr rtlCol="0" anchor="ctr"/>
+          <a:lstStyle/>
+          <a:p>
+            <a:pPr algn="ctr"/>
+            <a:r>
+              <a:rPr lang="en-US" sz="818" dirty="0"/>
+              <a:t>v</a:t>
+            </a:r>
+          </a:p>
+        </p:txBody>
+      </p:sp>
+      <p:sp>
+        <p:nvSpPr>
+          <p:cNvPr id="12" name="Rectangle 11"/>
+          <p:cNvSpPr/>
+          <p:nvPr/>
+        </p:nvSpPr>
+        <p:spPr>
+          <a:xfrm>
+            <a:off x="4205507" y="1560153"/>
+            <a:ext cx="3307977" cy="3986863"/>
+          </a:xfrm>
+          <a:prstGeom prst="rect">
+            <a:avLst/>
+          </a:prstGeom>
+          <a:solidFill>
+            <a:srgbClr val="FFCB05"/>
+          </a:solidFill>
+          <a:ln>
+            <a:noFill/>
+          </a:ln>
+          <a:effectLst>
+            <a:outerShdw blurRad="228600" dist="25400" sx="102000" sy="102000" algn="ctr" rotWithShape="0">
+              <a:prstClr val="black">
+                <a:alpha val="5000"/>
+              </a:prstClr>
+            </a:outerShdw>
+          </a:effectLst>
+        </p:spPr>
+        <p:style>
+          <a:lnRef idx="2">
+            <a:schemeClr val="accent1">
+              <a:shade val="50000"/>
+            </a:schemeClr>
+          </a:lnRef>
+          <a:fillRef idx="1">
+            <a:schemeClr val="accent1"/>
+          </a:fillRef>
+          <a:effectRef idx="0">
+            <a:schemeClr val="accent1"/>
+          </a:effectRef>
+          <a:fontRef idx="minor">
+            <a:schemeClr val="lt1"/>
+          </a:fontRef>
+        </p:style>
+        <p:txBody>
+          <a:bodyPr rtlCol="0" anchor="ctr"/>
+          <a:lstStyle/>
+          <a:p>
+            <a:pPr algn="ctr"/>
+            <a:r>
+              <a:rPr lang="en-US" sz="818" dirty="0"/>
+              <a:t>v</a:t>
+            </a:r>
+          </a:p>
+        </p:txBody>
+      </p:sp>
+      <p:sp>
+        <p:nvSpPr>
+          <p:cNvPr id="5" name="Rectangle 4"/>
+          <p:cNvSpPr/>
+          <p:nvPr/>
+        </p:nvSpPr>
+        <p:spPr>
+          <a:xfrm>
+            <a:off x="4152658" y="1405406"/>
+            <a:ext cx="3307977" cy="3986863"/>
+          </a:xfrm>
+          <a:prstGeom prst="rect">
+            <a:avLst/>
+          </a:prstGeom>
+          <a:solidFill>
+            <a:schemeClr val="bg1"/>
+          </a:solidFill>
+          <a:ln>
+            <a:noFill/>
+          </a:ln>
+          <a:effectLst>
+            <a:outerShdw blurRad="228600" dist="25400" sx="102000" sy="102000" algn="ctr" rotWithShape="0">
+              <a:prstClr val="black">
+                <a:alpha val="5000"/>
+              </a:prstClr>
+            </a:outerShdw>
+          </a:effectLst>
+          <a:scene3d>
+            <a:camera prst="perspectiveFront"/>
+            <a:lightRig rig="threePt" dir="t"/>
+          </a:scene3d>
+        </p:spPr>
+        <p:style>
+          <a:lnRef idx="2">
+            <a:schemeClr val="accent1">
+              <a:shade val="50000"/>
+            </a:schemeClr>
+          </a:lnRef>
+          <a:fillRef idx="1">
+            <a:schemeClr val="accent1"/>
+          </a:fillRef>
+          <a:effectRef idx="0">
+            <a:schemeClr val="accent1"/>
+          </a:effectRef>
+          <a:fontRef idx="minor">
+            <a:schemeClr val="lt1"/>
+          </a:fontRef>
+        </p:style>
+        <p:txBody>
+          <a:bodyPr rtlCol="0" anchor="ctr"/>
+          <a:lstStyle/>
+          <a:p>
+            <a:pPr algn="ctr"/>
+            <a:r>
+              <a:rPr lang="en-US" sz="818" dirty="0"/>
+              <a:t>v</a:t>
+            </a:r>
+          </a:p>
+        </p:txBody>
+      </p:sp>
+      <p:sp>
+        <p:nvSpPr>
+          <p:cNvPr id="6" name="Rectangle 5"/>
+          <p:cNvSpPr/>
+          <p:nvPr/>
+        </p:nvSpPr>
+        <p:spPr>
+          <a:xfrm>
+            <a:off x="4139211" y="1405406"/>
+            <a:ext cx="3321424" cy="2548029"/>
+          </a:xfrm>
+          <a:custGeom>
+            <a:avLst/>
+            <a:gdLst>
+              <a:gd name="connsiteX0" fmla="*/ 0 w 3307977"/>
+              <a:gd name="connsiteY0" fmla="*/ 0 h 2548029"/>
+              <a:gd name="connsiteX1" fmla="*/ 3307977 w 3307977"/>
+              <a:gd name="connsiteY1" fmla="*/ 0 h 2548029"/>
+              <a:gd name="connsiteX2" fmla="*/ 3307977 w 3307977"/>
+              <a:gd name="connsiteY2" fmla="*/ 2548029 h 2548029"/>
+              <a:gd name="connsiteX3" fmla="*/ 0 w 3307977"/>
+              <a:gd name="connsiteY3" fmla="*/ 2548029 h 2548029"/>
+              <a:gd name="connsiteX4" fmla="*/ 0 w 3307977"/>
+              <a:gd name="connsiteY4" fmla="*/ 0 h 2548029"/>
+              <a:gd name="connsiteX0" fmla="*/ 13447 w 3321424"/>
+              <a:gd name="connsiteY0" fmla="*/ 0 h 2548029"/>
+              <a:gd name="connsiteX1" fmla="*/ 3321424 w 3321424"/>
+              <a:gd name="connsiteY1" fmla="*/ 0 h 2548029"/>
+              <a:gd name="connsiteX2" fmla="*/ 3321424 w 3321424"/>
+              <a:gd name="connsiteY2" fmla="*/ 2548029 h 2548029"/>
+              <a:gd name="connsiteX3" fmla="*/ 0 w 3321424"/>
+              <a:gd name="connsiteY3" fmla="*/ 2292535 h 2548029"/>
+              <a:gd name="connsiteX4" fmla="*/ 13447 w 3321424"/>
+              <a:gd name="connsiteY4" fmla="*/ 0 h 2548029"/>
+            </a:gdLst>
+            <a:ahLst/>
+            <a:cxnLst>
+              <a:cxn ang="0">
+                <a:pos x="connsiteX0" y="connsiteY0"/>
+              </a:cxn>
+              <a:cxn ang="0">
+                <a:pos x="connsiteX1" y="connsiteY1"/>
+              </a:cxn>
+              <a:cxn ang="0">
+                <a:pos x="connsiteX2" y="connsiteY2"/>
+              </a:cxn>
+              <a:cxn ang="0">
+                <a:pos x="connsiteX3" y="connsiteY3"/>
+              </a:cxn>
+              <a:cxn ang="0">
+                <a:pos x="connsiteX4" y="connsiteY4"/>
+              </a:cxn>
+            </a:cxnLst>
+            <a:rect l="l" t="t" r="r" b="b"/>
+            <a:pathLst>
+              <a:path w="3321424" h="2548029">
+                <a:moveTo>
+                  <a:pt x="13447" y="0"/>
+                </a:moveTo>
+                <a:lnTo>
+                  <a:pt x="3321424" y="0"/>
+                </a:lnTo>
+                <a:lnTo>
+                  <a:pt x="3321424" y="2548029"/>
+                </a:lnTo>
+                <a:lnTo>
+                  <a:pt x="0" y="2292535"/>
+                </a:lnTo>
+                <a:cubicBezTo>
+                  <a:pt x="4482" y="1528357"/>
+                  <a:pt x="8965" y="764178"/>
+                  <a:pt x="13447" y="0"/>
+                </a:cubicBezTo>
+                <a:close/>
+              </a:path>
+            </a:pathLst>
+          </a:custGeom>
+          <a:solidFill>
+            <a:srgbClr val="FFCB05"/>
+          </a:solidFill>
+          <a:ln>
+            <a:noFill/>
+          </a:ln>
+        </p:spPr>
+        <p:style>
+          <a:lnRef idx="2">
+            <a:schemeClr val="accent1">
+              <a:shade val="50000"/>
+            </a:schemeClr>
+          </a:lnRef>
+          <a:fillRef idx="1">
+            <a:schemeClr val="accent1"/>
+          </a:fillRef>
+          <a:effectRef idx="0">
+            <a:schemeClr val="accent1"/>
+          </a:effectRef>
+          <a:fontRef idx="minor">
+            <a:schemeClr val="lt1"/>
+          </a:fontRef>
+        </p:style>
+        <p:txBody>
+          <a:bodyPr rtlCol="0" anchor="ctr"/>
+          <a:lstStyle/>
+          <a:p>
+            <a:pPr algn="ctr"/>
+            <a:endParaRPr lang="en-US"/>
+          </a:p>
+        </p:txBody>
+      </p:sp>
+      <p:pic>
+        <p:nvPicPr>
+          <p:cNvPr id="7" name="Picture 6"/>
+          <p:cNvPicPr>
+            <a:picLocks noChangeAspect="1"/>
+          </p:cNvPicPr>
+          <p:nvPr/>
+        </p:nvPicPr>
+        <p:blipFill>
+          <a:blip r:embed="rId2" cstate="print">
+            <a:extLst>
+              <a:ext uri="{28A0092B-C50C-407E-A947-70E740481C1C}">
+                <a14:useLocalDpi xmlns:a14="http://schemas.microsoft.com/office/drawing/2010/main" val="0"/>
+              </a:ext>
+            </a:extLst>
+          </a:blip>
+          <a:stretch>
+            <a:fillRect/>
+          </a:stretch>
+        </p:blipFill>
+        <p:spPr>
+          <a:xfrm flipH="1">
+            <a:off x="4152657" y="1405406"/>
+            <a:ext cx="3297609" cy="2198406"/>
+          </a:xfrm>
+          <a:prstGeom prst="rect">
+            <a:avLst/>
+          </a:prstGeom>
+        </p:spPr>
+      </p:pic>
+      <p:sp>
+        <p:nvSpPr>
+          <p:cNvPr id="8" name="TextBox 7"/>
+          <p:cNvSpPr txBox="1"/>
+          <p:nvPr/>
+        </p:nvSpPr>
+        <p:spPr>
+          <a:xfrm>
+            <a:off x="4683817" y="4205507"/>
+            <a:ext cx="2245658" cy="400110"/>
+          </a:xfrm>
+          <a:prstGeom prst="rect">
+            <a:avLst/>
+          </a:prstGeom>
+          <a:noFill/>
+        </p:spPr>
+        <p:txBody>
+          <a:bodyPr wrap="square" rtlCol="0">
+            <a:spAutoFit/>
+          </a:bodyPr>
+          <a:lstStyle/>
+          <a:p>
+            <a:r>
+              <a:rPr lang="en-US" sz="2000" dirty="0" smtClean="0"/>
+              <a:t>Get a device</a:t>
+            </a:r>
+            <a:endParaRPr lang="en-US" sz="2000" dirty="0"/>
+          </a:p>
+        </p:txBody>
+      </p:sp>
+      <p:sp>
+        <p:nvSpPr>
+          <p:cNvPr id="9" name="Round Diagonal Corner Rectangle 8"/>
+          <p:cNvSpPr/>
+          <p:nvPr/>
+        </p:nvSpPr>
+        <p:spPr>
+          <a:xfrm>
+            <a:off x="4152657" y="5015753"/>
+            <a:ext cx="3360827" cy="591671"/>
+          </a:xfrm>
+          <a:prstGeom prst="round2DiagRect">
+            <a:avLst/>
+          </a:prstGeom>
+          <a:solidFill>
+            <a:schemeClr val="tx1">
               <a:lumMod val="85000"/>
+              <a:lumOff val="15000"/>
             </a:schemeClr>
           </a:solidFill>
           <a:ln>
@@ -3009,6 +3351,1443 @@
           <a:p>
             <a:pPr algn="ctr"/>
             <a:endParaRPr lang="en-US"/>
+          </a:p>
+        </p:txBody>
+      </p:sp>
+      <p:sp>
+        <p:nvSpPr>
+          <p:cNvPr id="10" name="TextBox 9"/>
+          <p:cNvSpPr txBox="1"/>
+          <p:nvPr/>
+        </p:nvSpPr>
+        <p:spPr>
+          <a:xfrm>
+            <a:off x="4874865" y="5099737"/>
+            <a:ext cx="1244578" cy="400110"/>
+          </a:xfrm>
+          <a:prstGeom prst="rect">
+            <a:avLst/>
+          </a:prstGeom>
+          <a:noFill/>
+        </p:spPr>
+        <p:txBody>
+          <a:bodyPr wrap="square" rtlCol="0">
+            <a:spAutoFit/>
+          </a:bodyPr>
+          <a:lstStyle/>
+          <a:p>
+            <a:r>
+              <a:rPr lang="en-US" sz="2000" dirty="0" smtClean="0">
+                <a:solidFill>
+                  <a:schemeClr val="bg1"/>
+                </a:solidFill>
+              </a:rPr>
+              <a:t>Start here</a:t>
+            </a:r>
+            <a:r>
+              <a:rPr lang="en-US" sz="2000" dirty="0" smtClean="0">
+                <a:solidFill>
+                  <a:srgbClr val="FFCB05"/>
+                </a:solidFill>
+              </a:rPr>
+              <a:t> </a:t>
+            </a:r>
+            <a:endParaRPr lang="en-US" sz="2000" dirty="0">
+              <a:solidFill>
+                <a:srgbClr val="FFCB05"/>
+              </a:solidFill>
+            </a:endParaRPr>
+          </a:p>
+        </p:txBody>
+      </p:sp>
+      <p:sp>
+        <p:nvSpPr>
+          <p:cNvPr id="11" name="TextBox 10"/>
+          <p:cNvSpPr txBox="1"/>
+          <p:nvPr/>
+        </p:nvSpPr>
+        <p:spPr>
+          <a:xfrm>
+            <a:off x="6049103" y="5148774"/>
+            <a:ext cx="1007263" cy="369332"/>
+          </a:xfrm>
+          <a:prstGeom prst="rect">
+            <a:avLst/>
+          </a:prstGeom>
+          <a:noFill/>
+        </p:spPr>
+        <p:txBody>
+          <a:bodyPr wrap="square" rtlCol="0">
+            <a:spAutoFit/>
+          </a:bodyPr>
+          <a:lstStyle/>
+          <a:p>
+            <a:r>
+              <a:rPr lang="en-US" dirty="0" smtClean="0">
+                <a:solidFill>
+                  <a:srgbClr val="FFCB05"/>
+                </a:solidFill>
+                <a:sym typeface="Wingdings 3" panose="05040102010807070707" pitchFamily="18" charset="2"/>
+              </a:rPr>
+              <a:t></a:t>
+            </a:r>
+            <a:endParaRPr lang="en-US" dirty="0">
+              <a:solidFill>
+                <a:srgbClr val="FFCB05"/>
+              </a:solidFill>
+            </a:endParaRPr>
+          </a:p>
+        </p:txBody>
+      </p:sp>
+      <p:grpSp>
+        <p:nvGrpSpPr>
+          <p:cNvPr id="19" name="Group 18"/>
+          <p:cNvGrpSpPr/>
+          <p:nvPr/>
+        </p:nvGrpSpPr>
+        <p:grpSpPr>
+          <a:xfrm>
+            <a:off x="2041132" y="2322158"/>
+            <a:ext cx="1833518" cy="2541393"/>
+            <a:chOff x="2041132" y="2322158"/>
+            <a:chExt cx="1833518" cy="2541393"/>
+          </a:xfrm>
+        </p:grpSpPr>
+        <p:sp>
+          <p:nvSpPr>
+            <p:cNvPr id="13" name="Rectangle 12"/>
+            <p:cNvSpPr/>
+            <p:nvPr/>
+          </p:nvSpPr>
+          <p:spPr>
+            <a:xfrm>
+              <a:off x="2042151" y="2344073"/>
+              <a:ext cx="1831480" cy="2519478"/>
+            </a:xfrm>
+            <a:prstGeom prst="rect">
+              <a:avLst/>
+            </a:prstGeom>
+            <a:solidFill>
+              <a:schemeClr val="bg1"/>
+            </a:solidFill>
+            <a:ln>
+              <a:noFill/>
+            </a:ln>
+            <a:effectLst>
+              <a:outerShdw blurRad="228600" dist="25400" sx="102000" sy="102000" algn="ctr" rotWithShape="0">
+                <a:prstClr val="black">
+                  <a:alpha val="5000"/>
+                </a:prstClr>
+              </a:outerShdw>
+            </a:effectLst>
+          </p:spPr>
+          <p:style>
+            <a:lnRef idx="2">
+              <a:schemeClr val="accent1">
+                <a:shade val="50000"/>
+              </a:schemeClr>
+            </a:lnRef>
+            <a:fillRef idx="1">
+              <a:schemeClr val="accent1"/>
+            </a:fillRef>
+            <a:effectRef idx="0">
+              <a:schemeClr val="accent1"/>
+            </a:effectRef>
+            <a:fontRef idx="minor">
+              <a:schemeClr val="lt1"/>
+            </a:fontRef>
+          </p:style>
+          <p:txBody>
+            <a:bodyPr rtlCol="0" anchor="ctr"/>
+            <a:lstStyle/>
+            <a:p>
+              <a:pPr algn="ctr"/>
+              <a:r>
+                <a:rPr lang="en-US" sz="818" dirty="0"/>
+                <a:t>v</a:t>
+              </a:r>
+            </a:p>
+          </p:txBody>
+        </p:sp>
+        <p:sp>
+          <p:nvSpPr>
+            <p:cNvPr id="15" name="Rectangle 5"/>
+            <p:cNvSpPr/>
+            <p:nvPr/>
+          </p:nvSpPr>
+          <p:spPr>
+            <a:xfrm>
+              <a:off x="2045850" y="2336049"/>
+              <a:ext cx="1828800" cy="1423290"/>
+            </a:xfrm>
+            <a:custGeom>
+              <a:avLst/>
+              <a:gdLst>
+                <a:gd name="connsiteX0" fmla="*/ 0 w 3307977"/>
+                <a:gd name="connsiteY0" fmla="*/ 0 h 2548029"/>
+                <a:gd name="connsiteX1" fmla="*/ 3307977 w 3307977"/>
+                <a:gd name="connsiteY1" fmla="*/ 0 h 2548029"/>
+                <a:gd name="connsiteX2" fmla="*/ 3307977 w 3307977"/>
+                <a:gd name="connsiteY2" fmla="*/ 2548029 h 2548029"/>
+                <a:gd name="connsiteX3" fmla="*/ 0 w 3307977"/>
+                <a:gd name="connsiteY3" fmla="*/ 2548029 h 2548029"/>
+                <a:gd name="connsiteX4" fmla="*/ 0 w 3307977"/>
+                <a:gd name="connsiteY4" fmla="*/ 0 h 2548029"/>
+                <a:gd name="connsiteX0" fmla="*/ 13447 w 3321424"/>
+                <a:gd name="connsiteY0" fmla="*/ 0 h 2548029"/>
+                <a:gd name="connsiteX1" fmla="*/ 3321424 w 3321424"/>
+                <a:gd name="connsiteY1" fmla="*/ 0 h 2548029"/>
+                <a:gd name="connsiteX2" fmla="*/ 3321424 w 3321424"/>
+                <a:gd name="connsiteY2" fmla="*/ 2548029 h 2548029"/>
+                <a:gd name="connsiteX3" fmla="*/ 0 w 3321424"/>
+                <a:gd name="connsiteY3" fmla="*/ 2292535 h 2548029"/>
+                <a:gd name="connsiteX4" fmla="*/ 13447 w 3321424"/>
+                <a:gd name="connsiteY4" fmla="*/ 0 h 2548029"/>
+              </a:gdLst>
+              <a:ahLst/>
+              <a:cxnLst>
+                <a:cxn ang="0">
+                  <a:pos x="connsiteX0" y="connsiteY0"/>
+                </a:cxn>
+                <a:cxn ang="0">
+                  <a:pos x="connsiteX1" y="connsiteY1"/>
+                </a:cxn>
+                <a:cxn ang="0">
+                  <a:pos x="connsiteX2" y="connsiteY2"/>
+                </a:cxn>
+                <a:cxn ang="0">
+                  <a:pos x="connsiteX3" y="connsiteY3"/>
+                </a:cxn>
+                <a:cxn ang="0">
+                  <a:pos x="connsiteX4" y="connsiteY4"/>
+                </a:cxn>
+              </a:cxnLst>
+              <a:rect l="l" t="t" r="r" b="b"/>
+              <a:pathLst>
+                <a:path w="3321424" h="2548029">
+                  <a:moveTo>
+                    <a:pt x="13447" y="0"/>
+                  </a:moveTo>
+                  <a:lnTo>
+                    <a:pt x="3321424" y="0"/>
+                  </a:lnTo>
+                  <a:lnTo>
+                    <a:pt x="3321424" y="2548029"/>
+                  </a:lnTo>
+                  <a:lnTo>
+                    <a:pt x="0" y="2292535"/>
+                  </a:lnTo>
+                  <a:cubicBezTo>
+                    <a:pt x="4482" y="1528357"/>
+                    <a:pt x="8965" y="764178"/>
+                    <a:pt x="13447" y="0"/>
+                  </a:cubicBezTo>
+                  <a:close/>
+                </a:path>
+              </a:pathLst>
+            </a:custGeom>
+            <a:solidFill>
+              <a:srgbClr val="FFCB05">
+                <a:alpha val="69000"/>
+              </a:srgbClr>
+            </a:solidFill>
+            <a:ln>
+              <a:noFill/>
+            </a:ln>
+          </p:spPr>
+          <p:style>
+            <a:lnRef idx="2">
+              <a:schemeClr val="accent1">
+                <a:shade val="50000"/>
+              </a:schemeClr>
+            </a:lnRef>
+            <a:fillRef idx="1">
+              <a:schemeClr val="accent1"/>
+            </a:fillRef>
+            <a:effectRef idx="0">
+              <a:schemeClr val="accent1"/>
+            </a:effectRef>
+            <a:fontRef idx="minor">
+              <a:schemeClr val="lt1"/>
+            </a:fontRef>
+          </p:style>
+          <p:txBody>
+            <a:bodyPr rtlCol="0" anchor="ctr"/>
+            <a:lstStyle/>
+            <a:p>
+              <a:pPr algn="ctr"/>
+              <a:endParaRPr lang="en-US"/>
+            </a:p>
+          </p:txBody>
+        </p:sp>
+        <p:sp>
+          <p:nvSpPr>
+            <p:cNvPr id="16" name="TextBox 15"/>
+            <p:cNvSpPr txBox="1"/>
+            <p:nvPr/>
+          </p:nvSpPr>
+          <p:spPr>
+            <a:xfrm>
+              <a:off x="2408516" y="3950918"/>
+              <a:ext cx="1106903" cy="584775"/>
+            </a:xfrm>
+            <a:prstGeom prst="rect">
+              <a:avLst/>
+            </a:prstGeom>
+            <a:noFill/>
+          </p:spPr>
+          <p:txBody>
+            <a:bodyPr wrap="square" rtlCol="0">
+              <a:spAutoFit/>
+            </a:bodyPr>
+            <a:lstStyle/>
+            <a:p>
+              <a:pPr algn="ctr"/>
+              <a:r>
+                <a:rPr lang="en-US" sz="1600" dirty="0" smtClean="0"/>
+                <a:t>Home Internet</a:t>
+              </a:r>
+              <a:endParaRPr lang="en-US" sz="1600" dirty="0"/>
+            </a:p>
+          </p:txBody>
+        </p:sp>
+        <p:pic>
+          <p:nvPicPr>
+            <p:cNvPr id="18" name="Picture 17"/>
+            <p:cNvPicPr>
+              <a:picLocks noChangeAspect="1"/>
+            </p:cNvPicPr>
+            <p:nvPr/>
+          </p:nvPicPr>
+          <p:blipFill>
+            <a:blip r:embed="rId3" cstate="print">
+              <a:extLst>
+                <a:ext uri="{28A0092B-C50C-407E-A947-70E740481C1C}">
+                  <a14:useLocalDpi xmlns:a14="http://schemas.microsoft.com/office/drawing/2010/main" val="0"/>
+                </a:ext>
+              </a:extLst>
+            </a:blip>
+            <a:stretch>
+              <a:fillRect/>
+            </a:stretch>
+          </p:blipFill>
+          <p:spPr>
+            <a:xfrm>
+              <a:off x="2041132" y="2322158"/>
+              <a:ext cx="1832499" cy="1221666"/>
+            </a:xfrm>
+            <a:prstGeom prst="rect">
+              <a:avLst/>
+            </a:prstGeom>
+          </p:spPr>
+        </p:pic>
+      </p:grpSp>
+      <p:grpSp>
+        <p:nvGrpSpPr>
+          <p:cNvPr id="20" name="Group 19"/>
+          <p:cNvGrpSpPr/>
+          <p:nvPr/>
+        </p:nvGrpSpPr>
+        <p:grpSpPr>
+          <a:xfrm>
+            <a:off x="111505" y="2305742"/>
+            <a:ext cx="1833518" cy="2541393"/>
+            <a:chOff x="2041132" y="2322158"/>
+            <a:chExt cx="1833518" cy="2541393"/>
+          </a:xfrm>
+        </p:grpSpPr>
+        <p:sp>
+          <p:nvSpPr>
+            <p:cNvPr id="21" name="Rectangle 20"/>
+            <p:cNvSpPr/>
+            <p:nvPr/>
+          </p:nvSpPr>
+          <p:spPr>
+            <a:xfrm>
+              <a:off x="2042151" y="2344073"/>
+              <a:ext cx="1831480" cy="2519478"/>
+            </a:xfrm>
+            <a:prstGeom prst="rect">
+              <a:avLst/>
+            </a:prstGeom>
+            <a:solidFill>
+              <a:schemeClr val="bg1"/>
+            </a:solidFill>
+            <a:ln>
+              <a:noFill/>
+            </a:ln>
+            <a:effectLst>
+              <a:outerShdw blurRad="228600" dist="25400" sx="102000" sy="102000" algn="ctr" rotWithShape="0">
+                <a:prstClr val="black">
+                  <a:alpha val="5000"/>
+                </a:prstClr>
+              </a:outerShdw>
+            </a:effectLst>
+          </p:spPr>
+          <p:style>
+            <a:lnRef idx="2">
+              <a:schemeClr val="accent1">
+                <a:shade val="50000"/>
+              </a:schemeClr>
+            </a:lnRef>
+            <a:fillRef idx="1">
+              <a:schemeClr val="accent1"/>
+            </a:fillRef>
+            <a:effectRef idx="0">
+              <a:schemeClr val="accent1"/>
+            </a:effectRef>
+            <a:fontRef idx="minor">
+              <a:schemeClr val="lt1"/>
+            </a:fontRef>
+          </p:style>
+          <p:txBody>
+            <a:bodyPr rtlCol="0" anchor="ctr"/>
+            <a:lstStyle/>
+            <a:p>
+              <a:pPr algn="ctr"/>
+              <a:r>
+                <a:rPr lang="en-US" sz="818" dirty="0"/>
+                <a:t>v</a:t>
+              </a:r>
+            </a:p>
+          </p:txBody>
+        </p:sp>
+        <p:sp>
+          <p:nvSpPr>
+            <p:cNvPr id="22" name="Rectangle 5"/>
+            <p:cNvSpPr/>
+            <p:nvPr/>
+          </p:nvSpPr>
+          <p:spPr>
+            <a:xfrm>
+              <a:off x="2045850" y="2336049"/>
+              <a:ext cx="1828800" cy="1423290"/>
+            </a:xfrm>
+            <a:custGeom>
+              <a:avLst/>
+              <a:gdLst>
+                <a:gd name="connsiteX0" fmla="*/ 0 w 3307977"/>
+                <a:gd name="connsiteY0" fmla="*/ 0 h 2548029"/>
+                <a:gd name="connsiteX1" fmla="*/ 3307977 w 3307977"/>
+                <a:gd name="connsiteY1" fmla="*/ 0 h 2548029"/>
+                <a:gd name="connsiteX2" fmla="*/ 3307977 w 3307977"/>
+                <a:gd name="connsiteY2" fmla="*/ 2548029 h 2548029"/>
+                <a:gd name="connsiteX3" fmla="*/ 0 w 3307977"/>
+                <a:gd name="connsiteY3" fmla="*/ 2548029 h 2548029"/>
+                <a:gd name="connsiteX4" fmla="*/ 0 w 3307977"/>
+                <a:gd name="connsiteY4" fmla="*/ 0 h 2548029"/>
+                <a:gd name="connsiteX0" fmla="*/ 13447 w 3321424"/>
+                <a:gd name="connsiteY0" fmla="*/ 0 h 2548029"/>
+                <a:gd name="connsiteX1" fmla="*/ 3321424 w 3321424"/>
+                <a:gd name="connsiteY1" fmla="*/ 0 h 2548029"/>
+                <a:gd name="connsiteX2" fmla="*/ 3321424 w 3321424"/>
+                <a:gd name="connsiteY2" fmla="*/ 2548029 h 2548029"/>
+                <a:gd name="connsiteX3" fmla="*/ 0 w 3321424"/>
+                <a:gd name="connsiteY3" fmla="*/ 2292535 h 2548029"/>
+                <a:gd name="connsiteX4" fmla="*/ 13447 w 3321424"/>
+                <a:gd name="connsiteY4" fmla="*/ 0 h 2548029"/>
+              </a:gdLst>
+              <a:ahLst/>
+              <a:cxnLst>
+                <a:cxn ang="0">
+                  <a:pos x="connsiteX0" y="connsiteY0"/>
+                </a:cxn>
+                <a:cxn ang="0">
+                  <a:pos x="connsiteX1" y="connsiteY1"/>
+                </a:cxn>
+                <a:cxn ang="0">
+                  <a:pos x="connsiteX2" y="connsiteY2"/>
+                </a:cxn>
+                <a:cxn ang="0">
+                  <a:pos x="connsiteX3" y="connsiteY3"/>
+                </a:cxn>
+                <a:cxn ang="0">
+                  <a:pos x="connsiteX4" y="connsiteY4"/>
+                </a:cxn>
+              </a:cxnLst>
+              <a:rect l="l" t="t" r="r" b="b"/>
+              <a:pathLst>
+                <a:path w="3321424" h="2548029">
+                  <a:moveTo>
+                    <a:pt x="13447" y="0"/>
+                  </a:moveTo>
+                  <a:lnTo>
+                    <a:pt x="3321424" y="0"/>
+                  </a:lnTo>
+                  <a:lnTo>
+                    <a:pt x="3321424" y="2548029"/>
+                  </a:lnTo>
+                  <a:lnTo>
+                    <a:pt x="0" y="2292535"/>
+                  </a:lnTo>
+                  <a:cubicBezTo>
+                    <a:pt x="4482" y="1528357"/>
+                    <a:pt x="8965" y="764178"/>
+                    <a:pt x="13447" y="0"/>
+                  </a:cubicBezTo>
+                  <a:close/>
+                </a:path>
+              </a:pathLst>
+            </a:custGeom>
+            <a:solidFill>
+              <a:srgbClr val="FFCB05">
+                <a:alpha val="35000"/>
+              </a:srgbClr>
+            </a:solidFill>
+            <a:ln>
+              <a:noFill/>
+            </a:ln>
+          </p:spPr>
+          <p:style>
+            <a:lnRef idx="2">
+              <a:schemeClr val="accent1">
+                <a:shade val="50000"/>
+              </a:schemeClr>
+            </a:lnRef>
+            <a:fillRef idx="1">
+              <a:schemeClr val="accent1"/>
+            </a:fillRef>
+            <a:effectRef idx="0">
+              <a:schemeClr val="accent1"/>
+            </a:effectRef>
+            <a:fontRef idx="minor">
+              <a:schemeClr val="lt1"/>
+            </a:fontRef>
+          </p:style>
+          <p:txBody>
+            <a:bodyPr rtlCol="0" anchor="ctr"/>
+            <a:lstStyle/>
+            <a:p>
+              <a:pPr algn="ctr"/>
+              <a:endParaRPr lang="en-US"/>
+            </a:p>
+          </p:txBody>
+        </p:sp>
+        <p:sp>
+          <p:nvSpPr>
+            <p:cNvPr id="23" name="TextBox 22"/>
+            <p:cNvSpPr txBox="1"/>
+            <p:nvPr/>
+          </p:nvSpPr>
+          <p:spPr>
+            <a:xfrm>
+              <a:off x="2408516" y="3950918"/>
+              <a:ext cx="1106903" cy="584775"/>
+            </a:xfrm>
+            <a:prstGeom prst="rect">
+              <a:avLst/>
+            </a:prstGeom>
+            <a:noFill/>
+          </p:spPr>
+          <p:txBody>
+            <a:bodyPr wrap="square" rtlCol="0">
+              <a:spAutoFit/>
+            </a:bodyPr>
+            <a:lstStyle/>
+            <a:p>
+              <a:pPr algn="ctr"/>
+              <a:r>
+                <a:rPr lang="en-US" sz="1600" dirty="0" smtClean="0"/>
+                <a:t>Mobile Internet</a:t>
+              </a:r>
+              <a:endParaRPr lang="en-US" sz="1600" dirty="0"/>
+            </a:p>
+          </p:txBody>
+        </p:sp>
+        <p:pic>
+          <p:nvPicPr>
+            <p:cNvPr id="24" name="Picture 23"/>
+            <p:cNvPicPr>
+              <a:picLocks noChangeAspect="1"/>
+            </p:cNvPicPr>
+            <p:nvPr/>
+          </p:nvPicPr>
+          <p:blipFill>
+            <a:blip r:embed="rId4" cstate="print">
+              <a:extLst>
+                <a:ext uri="{28A0092B-C50C-407E-A947-70E740481C1C}">
+                  <a14:useLocalDpi xmlns:a14="http://schemas.microsoft.com/office/drawing/2010/main" val="0"/>
+                </a:ext>
+              </a:extLst>
+            </a:blip>
+            <a:stretch>
+              <a:fillRect/>
+            </a:stretch>
+          </p:blipFill>
+          <p:spPr>
+            <a:xfrm>
+              <a:off x="2041132" y="2322158"/>
+              <a:ext cx="1832499" cy="1221666"/>
+            </a:xfrm>
+            <a:prstGeom prst="rect">
+              <a:avLst/>
+            </a:prstGeom>
+          </p:spPr>
+        </p:pic>
+      </p:grpSp>
+      <p:grpSp>
+        <p:nvGrpSpPr>
+          <p:cNvPr id="25" name="Group 24"/>
+          <p:cNvGrpSpPr/>
+          <p:nvPr/>
+        </p:nvGrpSpPr>
+        <p:grpSpPr>
+          <a:xfrm>
+            <a:off x="7821797" y="2343467"/>
+            <a:ext cx="1833517" cy="2541393"/>
+            <a:chOff x="2041133" y="2322158"/>
+            <a:chExt cx="1833517" cy="2541393"/>
+          </a:xfrm>
+        </p:grpSpPr>
+        <p:sp>
+          <p:nvSpPr>
+            <p:cNvPr id="26" name="Rectangle 25"/>
+            <p:cNvSpPr/>
+            <p:nvPr/>
+          </p:nvSpPr>
+          <p:spPr>
+            <a:xfrm>
+              <a:off x="2042151" y="2344073"/>
+              <a:ext cx="1831480" cy="2519478"/>
+            </a:xfrm>
+            <a:prstGeom prst="rect">
+              <a:avLst/>
+            </a:prstGeom>
+            <a:solidFill>
+              <a:schemeClr val="bg1"/>
+            </a:solidFill>
+            <a:ln>
+              <a:noFill/>
+            </a:ln>
+            <a:effectLst>
+              <a:outerShdw blurRad="228600" dist="25400" sx="102000" sy="102000" algn="ctr" rotWithShape="0">
+                <a:prstClr val="black">
+                  <a:alpha val="5000"/>
+                </a:prstClr>
+              </a:outerShdw>
+            </a:effectLst>
+          </p:spPr>
+          <p:style>
+            <a:lnRef idx="2">
+              <a:schemeClr val="accent1">
+                <a:shade val="50000"/>
+              </a:schemeClr>
+            </a:lnRef>
+            <a:fillRef idx="1">
+              <a:schemeClr val="accent1"/>
+            </a:fillRef>
+            <a:effectRef idx="0">
+              <a:schemeClr val="accent1"/>
+            </a:effectRef>
+            <a:fontRef idx="minor">
+              <a:schemeClr val="lt1"/>
+            </a:fontRef>
+          </p:style>
+          <p:txBody>
+            <a:bodyPr rtlCol="0" anchor="ctr"/>
+            <a:lstStyle/>
+            <a:p>
+              <a:pPr algn="ctr"/>
+              <a:r>
+                <a:rPr lang="en-US" sz="818" dirty="0"/>
+                <a:t>v</a:t>
+              </a:r>
+            </a:p>
+          </p:txBody>
+        </p:sp>
+        <p:sp>
+          <p:nvSpPr>
+            <p:cNvPr id="27" name="Rectangle 5"/>
+            <p:cNvSpPr/>
+            <p:nvPr/>
+          </p:nvSpPr>
+          <p:spPr>
+            <a:xfrm>
+              <a:off x="2045850" y="2336049"/>
+              <a:ext cx="1828800" cy="1423290"/>
+            </a:xfrm>
+            <a:custGeom>
+              <a:avLst/>
+              <a:gdLst>
+                <a:gd name="connsiteX0" fmla="*/ 0 w 3307977"/>
+                <a:gd name="connsiteY0" fmla="*/ 0 h 2548029"/>
+                <a:gd name="connsiteX1" fmla="*/ 3307977 w 3307977"/>
+                <a:gd name="connsiteY1" fmla="*/ 0 h 2548029"/>
+                <a:gd name="connsiteX2" fmla="*/ 3307977 w 3307977"/>
+                <a:gd name="connsiteY2" fmla="*/ 2548029 h 2548029"/>
+                <a:gd name="connsiteX3" fmla="*/ 0 w 3307977"/>
+                <a:gd name="connsiteY3" fmla="*/ 2548029 h 2548029"/>
+                <a:gd name="connsiteX4" fmla="*/ 0 w 3307977"/>
+                <a:gd name="connsiteY4" fmla="*/ 0 h 2548029"/>
+                <a:gd name="connsiteX0" fmla="*/ 13447 w 3321424"/>
+                <a:gd name="connsiteY0" fmla="*/ 0 h 2548029"/>
+                <a:gd name="connsiteX1" fmla="*/ 3321424 w 3321424"/>
+                <a:gd name="connsiteY1" fmla="*/ 0 h 2548029"/>
+                <a:gd name="connsiteX2" fmla="*/ 3321424 w 3321424"/>
+                <a:gd name="connsiteY2" fmla="*/ 2548029 h 2548029"/>
+                <a:gd name="connsiteX3" fmla="*/ 0 w 3321424"/>
+                <a:gd name="connsiteY3" fmla="*/ 2292535 h 2548029"/>
+                <a:gd name="connsiteX4" fmla="*/ 13447 w 3321424"/>
+                <a:gd name="connsiteY4" fmla="*/ 0 h 2548029"/>
+              </a:gdLst>
+              <a:ahLst/>
+              <a:cxnLst>
+                <a:cxn ang="0">
+                  <a:pos x="connsiteX0" y="connsiteY0"/>
+                </a:cxn>
+                <a:cxn ang="0">
+                  <a:pos x="connsiteX1" y="connsiteY1"/>
+                </a:cxn>
+                <a:cxn ang="0">
+                  <a:pos x="connsiteX2" y="connsiteY2"/>
+                </a:cxn>
+                <a:cxn ang="0">
+                  <a:pos x="connsiteX3" y="connsiteY3"/>
+                </a:cxn>
+                <a:cxn ang="0">
+                  <a:pos x="connsiteX4" y="connsiteY4"/>
+                </a:cxn>
+              </a:cxnLst>
+              <a:rect l="l" t="t" r="r" b="b"/>
+              <a:pathLst>
+                <a:path w="3321424" h="2548029">
+                  <a:moveTo>
+                    <a:pt x="13447" y="0"/>
+                  </a:moveTo>
+                  <a:lnTo>
+                    <a:pt x="3321424" y="0"/>
+                  </a:lnTo>
+                  <a:lnTo>
+                    <a:pt x="3321424" y="2548029"/>
+                  </a:lnTo>
+                  <a:lnTo>
+                    <a:pt x="0" y="2292535"/>
+                  </a:lnTo>
+                  <a:cubicBezTo>
+                    <a:pt x="4482" y="1528357"/>
+                    <a:pt x="8965" y="764178"/>
+                    <a:pt x="13447" y="0"/>
+                  </a:cubicBezTo>
+                  <a:close/>
+                </a:path>
+              </a:pathLst>
+            </a:custGeom>
+            <a:solidFill>
+              <a:srgbClr val="FFCB05"/>
+            </a:solidFill>
+            <a:ln>
+              <a:noFill/>
+            </a:ln>
+          </p:spPr>
+          <p:style>
+            <a:lnRef idx="2">
+              <a:schemeClr val="accent1">
+                <a:shade val="50000"/>
+              </a:schemeClr>
+            </a:lnRef>
+            <a:fillRef idx="1">
+              <a:schemeClr val="accent1"/>
+            </a:fillRef>
+            <a:effectRef idx="0">
+              <a:schemeClr val="accent1"/>
+            </a:effectRef>
+            <a:fontRef idx="minor">
+              <a:schemeClr val="lt1"/>
+            </a:fontRef>
+          </p:style>
+          <p:txBody>
+            <a:bodyPr rtlCol="0" anchor="ctr"/>
+            <a:lstStyle/>
+            <a:p>
+              <a:pPr algn="ctr"/>
+              <a:endParaRPr lang="en-US"/>
+            </a:p>
+          </p:txBody>
+        </p:sp>
+        <p:sp>
+          <p:nvSpPr>
+            <p:cNvPr id="28" name="TextBox 27"/>
+            <p:cNvSpPr txBox="1"/>
+            <p:nvPr/>
+          </p:nvSpPr>
+          <p:spPr>
+            <a:xfrm>
+              <a:off x="2408516" y="3950918"/>
+              <a:ext cx="1106903" cy="584775"/>
+            </a:xfrm>
+            <a:prstGeom prst="rect">
+              <a:avLst/>
+            </a:prstGeom>
+            <a:noFill/>
+          </p:spPr>
+          <p:txBody>
+            <a:bodyPr wrap="square" rtlCol="0">
+              <a:spAutoFit/>
+            </a:bodyPr>
+            <a:lstStyle/>
+            <a:p>
+              <a:pPr algn="ctr"/>
+              <a:r>
+                <a:rPr lang="en-US" sz="1600" dirty="0" smtClean="0"/>
+                <a:t>Add a phone-line</a:t>
+              </a:r>
+              <a:endParaRPr lang="en-US" sz="1600" dirty="0"/>
+            </a:p>
+          </p:txBody>
+        </p:sp>
+        <p:pic>
+          <p:nvPicPr>
+            <p:cNvPr id="29" name="Picture 28"/>
+            <p:cNvPicPr>
+              <a:picLocks noChangeAspect="1"/>
+            </p:cNvPicPr>
+            <p:nvPr/>
+          </p:nvPicPr>
+          <p:blipFill>
+            <a:blip r:embed="rId5" cstate="print">
+              <a:extLst>
+                <a:ext uri="{28A0092B-C50C-407E-A947-70E740481C1C}">
+                  <a14:useLocalDpi xmlns:a14="http://schemas.microsoft.com/office/drawing/2010/main" val="0"/>
+                </a:ext>
+              </a:extLst>
+            </a:blip>
+            <a:stretch>
+              <a:fillRect/>
+            </a:stretch>
+          </p:blipFill>
+          <p:spPr>
+            <a:xfrm>
+              <a:off x="2041133" y="2322158"/>
+              <a:ext cx="1813810" cy="1246898"/>
+            </a:xfrm>
+            <a:prstGeom prst="rect">
+              <a:avLst/>
+            </a:prstGeom>
+          </p:spPr>
+        </p:pic>
+      </p:grpSp>
+      <p:sp>
+        <p:nvSpPr>
+          <p:cNvPr id="30" name="Rectangle 29"/>
+          <p:cNvSpPr/>
+          <p:nvPr/>
+        </p:nvSpPr>
+        <p:spPr>
+          <a:xfrm>
+            <a:off x="10396473" y="3934502"/>
+            <a:ext cx="1367237" cy="967406"/>
+          </a:xfrm>
+          <a:prstGeom prst="rect">
+            <a:avLst/>
+          </a:prstGeom>
+          <a:solidFill>
+            <a:srgbClr val="FFCB05"/>
+          </a:solidFill>
+          <a:ln>
+            <a:noFill/>
+          </a:ln>
+          <a:effectLst>
+            <a:outerShdw blurRad="228600" dist="25400" sx="102000" sy="102000" algn="ctr" rotWithShape="0">
+              <a:prstClr val="black">
+                <a:alpha val="5000"/>
+              </a:prstClr>
+            </a:outerShdw>
+          </a:effectLst>
+        </p:spPr>
+        <p:style>
+          <a:lnRef idx="2">
+            <a:schemeClr val="accent1">
+              <a:shade val="50000"/>
+            </a:schemeClr>
+          </a:lnRef>
+          <a:fillRef idx="1">
+            <a:schemeClr val="accent1"/>
+          </a:fillRef>
+          <a:effectRef idx="0">
+            <a:schemeClr val="accent1"/>
+          </a:effectRef>
+          <a:fontRef idx="minor">
+            <a:schemeClr val="lt1"/>
+          </a:fontRef>
+        </p:style>
+        <p:txBody>
+          <a:bodyPr rtlCol="0" anchor="ctr"/>
+          <a:lstStyle/>
+          <a:p>
+            <a:pPr algn="ctr"/>
+            <a:r>
+              <a:rPr lang="en-US" sz="818" dirty="0"/>
+              <a:t>v</a:t>
+            </a:r>
+          </a:p>
+        </p:txBody>
+      </p:sp>
+      <p:grpSp>
+        <p:nvGrpSpPr>
+          <p:cNvPr id="31" name="Group 30"/>
+          <p:cNvGrpSpPr/>
+          <p:nvPr/>
+        </p:nvGrpSpPr>
+        <p:grpSpPr>
+          <a:xfrm>
+            <a:off x="9888560" y="2305817"/>
+            <a:ext cx="1833518" cy="2541318"/>
+            <a:chOff x="2041132" y="2322233"/>
+            <a:chExt cx="1833518" cy="2541318"/>
+          </a:xfrm>
+        </p:grpSpPr>
+        <p:sp>
+          <p:nvSpPr>
+            <p:cNvPr id="32" name="Rectangle 31"/>
+            <p:cNvSpPr/>
+            <p:nvPr/>
+          </p:nvSpPr>
+          <p:spPr>
+            <a:xfrm>
+              <a:off x="2042151" y="2344073"/>
+              <a:ext cx="1831480" cy="2519478"/>
+            </a:xfrm>
+            <a:prstGeom prst="rect">
+              <a:avLst/>
+            </a:prstGeom>
+            <a:solidFill>
+              <a:schemeClr val="bg1"/>
+            </a:solidFill>
+            <a:ln>
+              <a:noFill/>
+            </a:ln>
+            <a:effectLst>
+              <a:outerShdw blurRad="228600" dist="25400" sx="102000" sy="102000" algn="ctr" rotWithShape="0">
+                <a:prstClr val="black">
+                  <a:alpha val="5000"/>
+                </a:prstClr>
+              </a:outerShdw>
+            </a:effectLst>
+          </p:spPr>
+          <p:style>
+            <a:lnRef idx="2">
+              <a:schemeClr val="accent1">
+                <a:shade val="50000"/>
+              </a:schemeClr>
+            </a:lnRef>
+            <a:fillRef idx="1">
+              <a:schemeClr val="accent1"/>
+            </a:fillRef>
+            <a:effectRef idx="0">
+              <a:schemeClr val="accent1"/>
+            </a:effectRef>
+            <a:fontRef idx="minor">
+              <a:schemeClr val="lt1"/>
+            </a:fontRef>
+          </p:style>
+          <p:txBody>
+            <a:bodyPr rtlCol="0" anchor="ctr"/>
+            <a:lstStyle/>
+            <a:p>
+              <a:pPr algn="ctr"/>
+              <a:r>
+                <a:rPr lang="en-US" sz="818" dirty="0"/>
+                <a:t>v</a:t>
+              </a:r>
+            </a:p>
+          </p:txBody>
+        </p:sp>
+        <p:sp>
+          <p:nvSpPr>
+            <p:cNvPr id="33" name="Rectangle 5"/>
+            <p:cNvSpPr/>
+            <p:nvPr/>
+          </p:nvSpPr>
+          <p:spPr>
+            <a:xfrm>
+              <a:off x="2045850" y="2336049"/>
+              <a:ext cx="1828800" cy="1423290"/>
+            </a:xfrm>
+            <a:custGeom>
+              <a:avLst/>
+              <a:gdLst>
+                <a:gd name="connsiteX0" fmla="*/ 0 w 3307977"/>
+                <a:gd name="connsiteY0" fmla="*/ 0 h 2548029"/>
+                <a:gd name="connsiteX1" fmla="*/ 3307977 w 3307977"/>
+                <a:gd name="connsiteY1" fmla="*/ 0 h 2548029"/>
+                <a:gd name="connsiteX2" fmla="*/ 3307977 w 3307977"/>
+                <a:gd name="connsiteY2" fmla="*/ 2548029 h 2548029"/>
+                <a:gd name="connsiteX3" fmla="*/ 0 w 3307977"/>
+                <a:gd name="connsiteY3" fmla="*/ 2548029 h 2548029"/>
+                <a:gd name="connsiteX4" fmla="*/ 0 w 3307977"/>
+                <a:gd name="connsiteY4" fmla="*/ 0 h 2548029"/>
+                <a:gd name="connsiteX0" fmla="*/ 13447 w 3321424"/>
+                <a:gd name="connsiteY0" fmla="*/ 0 h 2548029"/>
+                <a:gd name="connsiteX1" fmla="*/ 3321424 w 3321424"/>
+                <a:gd name="connsiteY1" fmla="*/ 0 h 2548029"/>
+                <a:gd name="connsiteX2" fmla="*/ 3321424 w 3321424"/>
+                <a:gd name="connsiteY2" fmla="*/ 2548029 h 2548029"/>
+                <a:gd name="connsiteX3" fmla="*/ 0 w 3321424"/>
+                <a:gd name="connsiteY3" fmla="*/ 2292535 h 2548029"/>
+                <a:gd name="connsiteX4" fmla="*/ 13447 w 3321424"/>
+                <a:gd name="connsiteY4" fmla="*/ 0 h 2548029"/>
+              </a:gdLst>
+              <a:ahLst/>
+              <a:cxnLst>
+                <a:cxn ang="0">
+                  <a:pos x="connsiteX0" y="connsiteY0"/>
+                </a:cxn>
+                <a:cxn ang="0">
+                  <a:pos x="connsiteX1" y="connsiteY1"/>
+                </a:cxn>
+                <a:cxn ang="0">
+                  <a:pos x="connsiteX2" y="connsiteY2"/>
+                </a:cxn>
+                <a:cxn ang="0">
+                  <a:pos x="connsiteX3" y="connsiteY3"/>
+                </a:cxn>
+                <a:cxn ang="0">
+                  <a:pos x="connsiteX4" y="connsiteY4"/>
+                </a:cxn>
+              </a:cxnLst>
+              <a:rect l="l" t="t" r="r" b="b"/>
+              <a:pathLst>
+                <a:path w="3321424" h="2548029">
+                  <a:moveTo>
+                    <a:pt x="13447" y="0"/>
+                  </a:moveTo>
+                  <a:lnTo>
+                    <a:pt x="3321424" y="0"/>
+                  </a:lnTo>
+                  <a:lnTo>
+                    <a:pt x="3321424" y="2548029"/>
+                  </a:lnTo>
+                  <a:lnTo>
+                    <a:pt x="0" y="2292535"/>
+                  </a:lnTo>
+                  <a:cubicBezTo>
+                    <a:pt x="4482" y="1528357"/>
+                    <a:pt x="8965" y="764178"/>
+                    <a:pt x="13447" y="0"/>
+                  </a:cubicBezTo>
+                  <a:close/>
+                </a:path>
+              </a:pathLst>
+            </a:custGeom>
+            <a:solidFill>
+              <a:srgbClr val="FFCB05">
+                <a:alpha val="69000"/>
+              </a:srgbClr>
+            </a:solidFill>
+            <a:ln>
+              <a:noFill/>
+            </a:ln>
+          </p:spPr>
+          <p:style>
+            <a:lnRef idx="2">
+              <a:schemeClr val="accent1">
+                <a:shade val="50000"/>
+              </a:schemeClr>
+            </a:lnRef>
+            <a:fillRef idx="1">
+              <a:schemeClr val="accent1"/>
+            </a:fillRef>
+            <a:effectRef idx="0">
+              <a:schemeClr val="accent1"/>
+            </a:effectRef>
+            <a:fontRef idx="minor">
+              <a:schemeClr val="lt1"/>
+            </a:fontRef>
+          </p:style>
+          <p:txBody>
+            <a:bodyPr rtlCol="0" anchor="ctr"/>
+            <a:lstStyle/>
+            <a:p>
+              <a:pPr algn="ctr"/>
+              <a:endParaRPr lang="en-US"/>
+            </a:p>
+          </p:txBody>
+        </p:sp>
+        <p:sp>
+          <p:nvSpPr>
+            <p:cNvPr id="34" name="TextBox 33"/>
+            <p:cNvSpPr txBox="1"/>
+            <p:nvPr/>
+          </p:nvSpPr>
+          <p:spPr>
+            <a:xfrm>
+              <a:off x="2408516" y="4105666"/>
+              <a:ext cx="1106903" cy="338554"/>
+            </a:xfrm>
+            <a:prstGeom prst="rect">
+              <a:avLst/>
+            </a:prstGeom>
+            <a:noFill/>
+          </p:spPr>
+          <p:txBody>
+            <a:bodyPr wrap="square" rtlCol="0">
+              <a:spAutoFit/>
+            </a:bodyPr>
+            <a:lstStyle/>
+            <a:p>
+              <a:pPr algn="ctr"/>
+              <a:r>
+                <a:rPr lang="en-US" sz="1600" dirty="0" smtClean="0"/>
+                <a:t>Upgrade</a:t>
+              </a:r>
+              <a:endParaRPr lang="en-US" sz="1600" dirty="0"/>
+            </a:p>
+          </p:txBody>
+        </p:sp>
+        <p:pic>
+          <p:nvPicPr>
+            <p:cNvPr id="35" name="Picture 34"/>
+            <p:cNvPicPr>
+              <a:picLocks noChangeAspect="1"/>
+            </p:cNvPicPr>
+            <p:nvPr/>
+          </p:nvPicPr>
+          <p:blipFill>
+            <a:blip r:embed="rId6" cstate="print">
+              <a:extLst>
+                <a:ext uri="{28A0092B-C50C-407E-A947-70E740481C1C}">
+                  <a14:useLocalDpi xmlns:a14="http://schemas.microsoft.com/office/drawing/2010/main" val="0"/>
+                </a:ext>
+              </a:extLst>
+            </a:blip>
+            <a:stretch>
+              <a:fillRect/>
+            </a:stretch>
+          </p:blipFill>
+          <p:spPr>
+            <a:xfrm>
+              <a:off x="2041132" y="2322233"/>
+              <a:ext cx="1832499" cy="1221516"/>
+            </a:xfrm>
+            <a:prstGeom prst="rect">
+              <a:avLst/>
+            </a:prstGeom>
+          </p:spPr>
+        </p:pic>
+      </p:grpSp>
+      <p:sp>
+        <p:nvSpPr>
+          <p:cNvPr id="36" name="TextBox 35"/>
+          <p:cNvSpPr txBox="1"/>
+          <p:nvPr/>
+        </p:nvSpPr>
+        <p:spPr>
+          <a:xfrm>
+            <a:off x="1210235" y="1351618"/>
+            <a:ext cx="1559859" cy="369332"/>
+          </a:xfrm>
+          <a:prstGeom prst="rect">
+            <a:avLst/>
+          </a:prstGeom>
+          <a:noFill/>
+        </p:spPr>
+        <p:txBody>
+          <a:bodyPr wrap="square" rtlCol="0">
+            <a:spAutoFit/>
+          </a:bodyPr>
+          <a:lstStyle/>
+          <a:p>
+            <a:r>
+              <a:rPr lang="en-US" dirty="0" smtClean="0"/>
+              <a:t>What are you</a:t>
+            </a:r>
+            <a:endParaRPr lang="en-US" dirty="0"/>
+          </a:p>
+        </p:txBody>
+      </p:sp>
+      <p:sp>
+        <p:nvSpPr>
+          <p:cNvPr id="37" name="TextBox 36"/>
+          <p:cNvSpPr txBox="1"/>
+          <p:nvPr/>
+        </p:nvSpPr>
+        <p:spPr>
+          <a:xfrm>
+            <a:off x="1214718" y="1625041"/>
+            <a:ext cx="1559859" cy="369332"/>
+          </a:xfrm>
+          <a:prstGeom prst="rect">
+            <a:avLst/>
+          </a:prstGeom>
+          <a:noFill/>
+        </p:spPr>
+        <p:txBody>
+          <a:bodyPr wrap="square" rtlCol="0">
+            <a:spAutoFit/>
+          </a:bodyPr>
+          <a:lstStyle/>
+          <a:p>
+            <a:r>
+              <a:rPr lang="en-US" b="1" dirty="0"/>
+              <a:t>h</a:t>
+            </a:r>
+            <a:r>
+              <a:rPr lang="en-US" b="1" smtClean="0"/>
+              <a:t>ere </a:t>
+            </a:r>
+            <a:r>
+              <a:rPr lang="en-US" b="1" dirty="0" smtClean="0"/>
+              <a:t>to do</a:t>
+            </a:r>
+            <a:r>
+              <a:rPr lang="en-US" b="1" dirty="0" smtClean="0">
+                <a:solidFill>
+                  <a:srgbClr val="C00000"/>
+                </a:solidFill>
+              </a:rPr>
+              <a:t>?</a:t>
+            </a:r>
+            <a:endParaRPr lang="en-US" b="1" dirty="0">
+              <a:solidFill>
+                <a:srgbClr val="C00000"/>
+              </a:solidFill>
+            </a:endParaRPr>
+          </a:p>
+        </p:txBody>
+      </p:sp>
+      <p:grpSp>
+        <p:nvGrpSpPr>
+          <p:cNvPr id="40" name="Group 39"/>
+          <p:cNvGrpSpPr/>
+          <p:nvPr/>
+        </p:nvGrpSpPr>
+        <p:grpSpPr>
+          <a:xfrm>
+            <a:off x="3915962" y="6167718"/>
+            <a:ext cx="626894" cy="316004"/>
+            <a:chOff x="3889068" y="6199094"/>
+            <a:chExt cx="626894" cy="316004"/>
+          </a:xfrm>
+        </p:grpSpPr>
+        <p:sp>
+          <p:nvSpPr>
+            <p:cNvPr id="38" name="Oval 37"/>
+            <p:cNvSpPr/>
+            <p:nvPr/>
+          </p:nvSpPr>
+          <p:spPr>
+            <a:xfrm>
+              <a:off x="3912057" y="6199094"/>
+              <a:ext cx="292608" cy="295835"/>
+            </a:xfrm>
+            <a:prstGeom prst="ellipse">
+              <a:avLst/>
+            </a:prstGeom>
+            <a:solidFill>
+              <a:srgbClr val="FFCB05"/>
+            </a:solidFill>
+            <a:ln>
+              <a:noFill/>
+            </a:ln>
+          </p:spPr>
+          <p:style>
+            <a:lnRef idx="2">
+              <a:schemeClr val="accent1">
+                <a:shade val="50000"/>
+              </a:schemeClr>
+            </a:lnRef>
+            <a:fillRef idx="1">
+              <a:schemeClr val="accent1"/>
+            </a:fillRef>
+            <a:effectRef idx="0">
+              <a:schemeClr val="accent1"/>
+            </a:effectRef>
+            <a:fontRef idx="minor">
+              <a:schemeClr val="lt1"/>
+            </a:fontRef>
+          </p:style>
+          <p:txBody>
+            <a:bodyPr rtlCol="0" anchor="ctr"/>
+            <a:lstStyle/>
+            <a:p>
+              <a:pPr algn="ctr"/>
+              <a:endParaRPr lang="en-US"/>
+            </a:p>
+          </p:txBody>
+        </p:sp>
+        <p:sp>
+          <p:nvSpPr>
+            <p:cNvPr id="39" name="TextBox 38"/>
+            <p:cNvSpPr txBox="1"/>
+            <p:nvPr/>
+          </p:nvSpPr>
+          <p:spPr>
+            <a:xfrm>
+              <a:off x="3889068" y="6207321"/>
+              <a:ext cx="626894" cy="307777"/>
+            </a:xfrm>
+            <a:prstGeom prst="rect">
+              <a:avLst/>
+            </a:prstGeom>
+            <a:noFill/>
+          </p:spPr>
+          <p:txBody>
+            <a:bodyPr wrap="square" rtlCol="0">
+              <a:spAutoFit/>
+            </a:bodyPr>
+            <a:lstStyle/>
+            <a:p>
+              <a:r>
+                <a:rPr lang="en-US" sz="1400" dirty="0" smtClean="0">
+                  <a:sym typeface="Wingdings 3" panose="05040102010807070707" pitchFamily="18" charset="2"/>
+                </a:rPr>
+                <a:t></a:t>
+              </a:r>
+              <a:endParaRPr lang="en-US" sz="1400" dirty="0"/>
+            </a:p>
+          </p:txBody>
+        </p:sp>
+      </p:grpSp>
+      <p:grpSp>
+        <p:nvGrpSpPr>
+          <p:cNvPr id="41" name="Group 40"/>
+          <p:cNvGrpSpPr/>
+          <p:nvPr/>
+        </p:nvGrpSpPr>
+        <p:grpSpPr>
+          <a:xfrm>
+            <a:off x="7036244" y="6127377"/>
+            <a:ext cx="630799" cy="316004"/>
+            <a:chOff x="3912057" y="6199094"/>
+            <a:chExt cx="630799" cy="316004"/>
+          </a:xfrm>
+        </p:grpSpPr>
+        <p:sp>
+          <p:nvSpPr>
+            <p:cNvPr id="42" name="Oval 41"/>
+            <p:cNvSpPr/>
+            <p:nvPr/>
+          </p:nvSpPr>
+          <p:spPr>
+            <a:xfrm>
+              <a:off x="3912057" y="6199094"/>
+              <a:ext cx="292608" cy="295835"/>
+            </a:xfrm>
+            <a:prstGeom prst="ellipse">
+              <a:avLst/>
+            </a:prstGeom>
+            <a:solidFill>
+              <a:srgbClr val="FFCB05"/>
+            </a:solidFill>
+            <a:ln>
+              <a:noFill/>
+            </a:ln>
+          </p:spPr>
+          <p:style>
+            <a:lnRef idx="2">
+              <a:schemeClr val="accent1">
+                <a:shade val="50000"/>
+              </a:schemeClr>
+            </a:lnRef>
+            <a:fillRef idx="1">
+              <a:schemeClr val="accent1"/>
+            </a:fillRef>
+            <a:effectRef idx="0">
+              <a:schemeClr val="accent1"/>
+            </a:effectRef>
+            <a:fontRef idx="minor">
+              <a:schemeClr val="lt1"/>
+            </a:fontRef>
+          </p:style>
+          <p:txBody>
+            <a:bodyPr rtlCol="0" anchor="ctr"/>
+            <a:lstStyle/>
+            <a:p>
+              <a:pPr algn="ctr"/>
+              <a:endParaRPr lang="en-US"/>
+            </a:p>
+          </p:txBody>
+        </p:sp>
+        <p:sp>
+          <p:nvSpPr>
+            <p:cNvPr id="43" name="TextBox 42"/>
+            <p:cNvSpPr txBox="1"/>
+            <p:nvPr/>
+          </p:nvSpPr>
+          <p:spPr>
+            <a:xfrm>
+              <a:off x="3915962" y="6207321"/>
+              <a:ext cx="626894" cy="307777"/>
+            </a:xfrm>
+            <a:prstGeom prst="rect">
+              <a:avLst/>
+            </a:prstGeom>
+            <a:noFill/>
+          </p:spPr>
+          <p:txBody>
+            <a:bodyPr wrap="square" rtlCol="0">
+              <a:spAutoFit/>
+            </a:bodyPr>
+            <a:lstStyle/>
+            <a:p>
+              <a:r>
+                <a:rPr lang="en-US" sz="1400" dirty="0" smtClean="0">
+                  <a:sym typeface="Wingdings 3" panose="05040102010807070707" pitchFamily="18" charset="2"/>
+                </a:rPr>
+                <a:t></a:t>
+              </a:r>
+              <a:endParaRPr lang="en-US" sz="1400" dirty="0"/>
+            </a:p>
+          </p:txBody>
+        </p:sp>
+      </p:grpSp>
+      <p:sp>
+        <p:nvSpPr>
+          <p:cNvPr id="44" name="TextBox 43"/>
+          <p:cNvSpPr txBox="1"/>
+          <p:nvPr/>
+        </p:nvSpPr>
+        <p:spPr>
+          <a:xfrm>
+            <a:off x="6403070" y="6122157"/>
+            <a:ext cx="648950" cy="338554"/>
+          </a:xfrm>
+          <a:prstGeom prst="rect">
+            <a:avLst/>
+          </a:prstGeom>
+          <a:noFill/>
+        </p:spPr>
+        <p:txBody>
+          <a:bodyPr wrap="square" rtlCol="0">
+            <a:spAutoFit/>
+          </a:bodyPr>
+          <a:lstStyle/>
+          <a:p>
+            <a:r>
+              <a:rPr lang="en-US" sz="1600" dirty="0" smtClean="0"/>
+              <a:t>Next</a:t>
+            </a:r>
+            <a:endParaRPr lang="en-US" sz="1600" dirty="0"/>
+          </a:p>
+        </p:txBody>
+      </p:sp>
+      <p:sp>
+        <p:nvSpPr>
+          <p:cNvPr id="45" name="TextBox 44"/>
+          <p:cNvSpPr txBox="1"/>
+          <p:nvPr/>
+        </p:nvSpPr>
+        <p:spPr>
+          <a:xfrm>
+            <a:off x="4336712" y="6153534"/>
+            <a:ext cx="974876" cy="338554"/>
+          </a:xfrm>
+          <a:prstGeom prst="rect">
+            <a:avLst/>
+          </a:prstGeom>
+          <a:noFill/>
+        </p:spPr>
+        <p:txBody>
+          <a:bodyPr wrap="square" rtlCol="0">
+            <a:spAutoFit/>
+          </a:bodyPr>
+          <a:lstStyle/>
+          <a:p>
+            <a:r>
+              <a:rPr lang="en-US" sz="1600" dirty="0" smtClean="0"/>
+              <a:t>Previous</a:t>
+            </a:r>
+            <a:endParaRPr lang="en-US" sz="1600" dirty="0"/>
           </a:p>
         </p:txBody>
       </p:sp>

</xml_diff>